<commit_message>
Code status submission Ag Sys, calc_model run on server H:/
</commit_message>
<xml_diff>
--- a/img/concept_adaption.pptx
+++ b/img/concept_adaption.pptx
@@ -113,6 +113,35 @@
 </p:presentation>
 </file>
 
+<file path=ppt/changesInfos/changesInfo1.xml><?xml version="1.0" encoding="utf-8"?>
+<pc:chgInfo xmlns:a="http://schemas.openxmlformats.org/drawingml/2006/main" xmlns:r="http://schemas.openxmlformats.org/officeDocument/2006/relationships" xmlns:ac="http://schemas.microsoft.com/office/drawing/2013/main/command" xmlns:pc="http://schemas.microsoft.com/office/powerpoint/2013/main/command">
+  <pc:docChgLst>
+    <pc:chgData name="Stetter  Christian" userId="8f9271a8-a5cf-46e6-a299-55a74a5b579e" providerId="ADAL" clId="{08850CF0-4D3D-4DD0-8F75-BC545DE95787}"/>
+    <pc:docChg chg="modSld">
+      <pc:chgData name="Stetter  Christian" userId="8f9271a8-a5cf-46e6-a299-55a74a5b579e" providerId="ADAL" clId="{08850CF0-4D3D-4DD0-8F75-BC545DE95787}" dt="2023-09-13T07:52:40.345" v="1" actId="1076"/>
+      <pc:docMkLst>
+        <pc:docMk/>
+      </pc:docMkLst>
+      <pc:sldChg chg="modSp mod">
+        <pc:chgData name="Stetter  Christian" userId="8f9271a8-a5cf-46e6-a299-55a74a5b579e" providerId="ADAL" clId="{08850CF0-4D3D-4DD0-8F75-BC545DE95787}" dt="2023-09-13T07:52:40.345" v="1" actId="1076"/>
+        <pc:sldMkLst>
+          <pc:docMk/>
+          <pc:sldMk cId="122330818" sldId="258"/>
+        </pc:sldMkLst>
+        <pc:spChg chg="mod">
+          <ac:chgData name="Stetter  Christian" userId="8f9271a8-a5cf-46e6-a299-55a74a5b579e" providerId="ADAL" clId="{08850CF0-4D3D-4DD0-8F75-BC545DE95787}" dt="2023-09-13T07:52:40.345" v="1" actId="1076"/>
+          <ac:spMkLst>
+            <pc:docMk/>
+            <pc:sldMk cId="122330818" sldId="258"/>
+            <ac:spMk id="4" creationId="{00000000-0000-0000-0000-000000000000}"/>
+          </ac:spMkLst>
+        </pc:spChg>
+      </pc:sldChg>
+    </pc:docChg>
+  </pc:docChgLst>
+</pc:chgInfo>
+</file>
+
 <file path=ppt/slideLayouts/slideLayout1.xml><?xml version="1.0" encoding="utf-8"?>
 <p:sldLayout xmlns:a="http://schemas.openxmlformats.org/drawingml/2006/main" xmlns:r="http://schemas.openxmlformats.org/officeDocument/2006/relationships" xmlns:p="http://schemas.openxmlformats.org/presentationml/2006/main" type="title" preserve="1">
   <p:cSld name="Titelfolie">
@@ -155,7 +184,7 @@
           </a:lstStyle>
           <a:p>
             <a:r>
-              <a:rPr lang="de-DE" smtClean="0"/>
+              <a:rPr lang="de-DE"/>
               <a:t>Titelmasterformat durch Klicken bearbeiten</a:t>
             </a:r>
             <a:endParaRPr lang="en-US"/>
@@ -220,7 +249,7 @@
           </a:lstStyle>
           <a:p>
             <a:r>
-              <a:rPr lang="de-DE" smtClean="0"/>
+              <a:rPr lang="de-DE"/>
               <a:t>Formatvorlage des Untertitelmasters durch Klicken bearbeiten</a:t>
             </a:r>
             <a:endParaRPr lang="en-US"/>
@@ -244,7 +273,7 @@
           <a:p>
             <a:fld id="{E7CC1B40-3AE4-4ADE-B0C0-5D973D016158}" type="datetimeFigureOut">
               <a:rPr lang="en-US" smtClean="0"/>
-              <a:t>9/22/2021</a:t>
+              <a:t>9/13/2023</a:t>
             </a:fld>
             <a:endParaRPr lang="en-US"/>
           </a:p>
@@ -286,7 +315,7 @@
           <a:p>
             <a:fld id="{BF2CA33F-8121-49DC-AA02-31EB13F2FAB8}" type="slidenum">
               <a:rPr lang="en-US" smtClean="0"/>
-              <a:t>‹Nr.›</a:t>
+              <a:t>‹#›</a:t>
             </a:fld>
             <a:endParaRPr lang="en-US"/>
           </a:p>
@@ -338,7 +367,7 @@
           <a:lstStyle/>
           <a:p>
             <a:r>
-              <a:rPr lang="de-DE" smtClean="0"/>
+              <a:rPr lang="de-DE"/>
               <a:t>Titelmasterformat durch Klicken bearbeiten</a:t>
             </a:r>
             <a:endParaRPr lang="en-US"/>
@@ -362,35 +391,35 @@
           <a:p>
             <a:pPr lvl="0"/>
             <a:r>
-              <a:rPr lang="de-DE" smtClean="0"/>
+              <a:rPr lang="de-DE"/>
               <a:t>Formatvorlagen des Textmasters bearbeiten</a:t>
             </a:r>
           </a:p>
           <a:p>
             <a:pPr lvl="1"/>
             <a:r>
-              <a:rPr lang="de-DE" smtClean="0"/>
+              <a:rPr lang="de-DE"/>
               <a:t>Zweite Ebene</a:t>
             </a:r>
           </a:p>
           <a:p>
             <a:pPr lvl="2"/>
             <a:r>
-              <a:rPr lang="de-DE" smtClean="0"/>
+              <a:rPr lang="de-DE"/>
               <a:t>Dritte Ebene</a:t>
             </a:r>
           </a:p>
           <a:p>
             <a:pPr lvl="3"/>
             <a:r>
-              <a:rPr lang="de-DE" smtClean="0"/>
+              <a:rPr lang="de-DE"/>
               <a:t>Vierte Ebene</a:t>
             </a:r>
           </a:p>
           <a:p>
             <a:pPr lvl="4"/>
             <a:r>
-              <a:rPr lang="de-DE" smtClean="0"/>
+              <a:rPr lang="de-DE"/>
               <a:t>Fünfte Ebene</a:t>
             </a:r>
             <a:endParaRPr lang="en-US"/>
@@ -414,7 +443,7 @@
           <a:p>
             <a:fld id="{E7CC1B40-3AE4-4ADE-B0C0-5D973D016158}" type="datetimeFigureOut">
               <a:rPr lang="en-US" smtClean="0"/>
-              <a:t>9/22/2021</a:t>
+              <a:t>9/13/2023</a:t>
             </a:fld>
             <a:endParaRPr lang="en-US"/>
           </a:p>
@@ -456,7 +485,7 @@
           <a:p>
             <a:fld id="{BF2CA33F-8121-49DC-AA02-31EB13F2FAB8}" type="slidenum">
               <a:rPr lang="en-US" smtClean="0"/>
-              <a:t>‹Nr.›</a:t>
+              <a:t>‹#›</a:t>
             </a:fld>
             <a:endParaRPr lang="en-US"/>
           </a:p>
@@ -513,7 +542,7 @@
           <a:lstStyle/>
           <a:p>
             <a:r>
-              <a:rPr lang="de-DE" smtClean="0"/>
+              <a:rPr lang="de-DE"/>
               <a:t>Titelmasterformat durch Klicken bearbeiten</a:t>
             </a:r>
             <a:endParaRPr lang="en-US"/>
@@ -542,35 +571,35 @@
           <a:p>
             <a:pPr lvl="0"/>
             <a:r>
-              <a:rPr lang="de-DE" smtClean="0"/>
+              <a:rPr lang="de-DE"/>
               <a:t>Formatvorlagen des Textmasters bearbeiten</a:t>
             </a:r>
           </a:p>
           <a:p>
             <a:pPr lvl="1"/>
             <a:r>
-              <a:rPr lang="de-DE" smtClean="0"/>
+              <a:rPr lang="de-DE"/>
               <a:t>Zweite Ebene</a:t>
             </a:r>
           </a:p>
           <a:p>
             <a:pPr lvl="2"/>
             <a:r>
-              <a:rPr lang="de-DE" smtClean="0"/>
+              <a:rPr lang="de-DE"/>
               <a:t>Dritte Ebene</a:t>
             </a:r>
           </a:p>
           <a:p>
             <a:pPr lvl="3"/>
             <a:r>
-              <a:rPr lang="de-DE" smtClean="0"/>
+              <a:rPr lang="de-DE"/>
               <a:t>Vierte Ebene</a:t>
             </a:r>
           </a:p>
           <a:p>
             <a:pPr lvl="4"/>
             <a:r>
-              <a:rPr lang="de-DE" smtClean="0"/>
+              <a:rPr lang="de-DE"/>
               <a:t>Fünfte Ebene</a:t>
             </a:r>
             <a:endParaRPr lang="en-US"/>
@@ -594,7 +623,7 @@
           <a:p>
             <a:fld id="{E7CC1B40-3AE4-4ADE-B0C0-5D973D016158}" type="datetimeFigureOut">
               <a:rPr lang="en-US" smtClean="0"/>
-              <a:t>9/22/2021</a:t>
+              <a:t>9/13/2023</a:t>
             </a:fld>
             <a:endParaRPr lang="en-US"/>
           </a:p>
@@ -636,7 +665,7 @@
           <a:p>
             <a:fld id="{BF2CA33F-8121-49DC-AA02-31EB13F2FAB8}" type="slidenum">
               <a:rPr lang="en-US" smtClean="0"/>
-              <a:t>‹Nr.›</a:t>
+              <a:t>‹#›</a:t>
             </a:fld>
             <a:endParaRPr lang="en-US"/>
           </a:p>
@@ -688,7 +717,7 @@
           <a:lstStyle/>
           <a:p>
             <a:r>
-              <a:rPr lang="de-DE" smtClean="0"/>
+              <a:rPr lang="de-DE"/>
               <a:t>Titelmasterformat durch Klicken bearbeiten</a:t>
             </a:r>
             <a:endParaRPr lang="en-US"/>
@@ -712,35 +741,35 @@
           <a:p>
             <a:pPr lvl="0"/>
             <a:r>
-              <a:rPr lang="de-DE" smtClean="0"/>
+              <a:rPr lang="de-DE"/>
               <a:t>Formatvorlagen des Textmasters bearbeiten</a:t>
             </a:r>
           </a:p>
           <a:p>
             <a:pPr lvl="1"/>
             <a:r>
-              <a:rPr lang="de-DE" smtClean="0"/>
+              <a:rPr lang="de-DE"/>
               <a:t>Zweite Ebene</a:t>
             </a:r>
           </a:p>
           <a:p>
             <a:pPr lvl="2"/>
             <a:r>
-              <a:rPr lang="de-DE" smtClean="0"/>
+              <a:rPr lang="de-DE"/>
               <a:t>Dritte Ebene</a:t>
             </a:r>
           </a:p>
           <a:p>
             <a:pPr lvl="3"/>
             <a:r>
-              <a:rPr lang="de-DE" smtClean="0"/>
+              <a:rPr lang="de-DE"/>
               <a:t>Vierte Ebene</a:t>
             </a:r>
           </a:p>
           <a:p>
             <a:pPr lvl="4"/>
             <a:r>
-              <a:rPr lang="de-DE" smtClean="0"/>
+              <a:rPr lang="de-DE"/>
               <a:t>Fünfte Ebene</a:t>
             </a:r>
             <a:endParaRPr lang="en-US"/>
@@ -764,7 +793,7 @@
           <a:p>
             <a:fld id="{E7CC1B40-3AE4-4ADE-B0C0-5D973D016158}" type="datetimeFigureOut">
               <a:rPr lang="en-US" smtClean="0"/>
-              <a:t>9/22/2021</a:t>
+              <a:t>9/13/2023</a:t>
             </a:fld>
             <a:endParaRPr lang="en-US"/>
           </a:p>
@@ -806,7 +835,7 @@
           <a:p>
             <a:fld id="{BF2CA33F-8121-49DC-AA02-31EB13F2FAB8}" type="slidenum">
               <a:rPr lang="en-US" smtClean="0"/>
-              <a:t>‹Nr.›</a:t>
+              <a:t>‹#›</a:t>
             </a:fld>
             <a:endParaRPr lang="en-US"/>
           </a:p>
@@ -867,7 +896,7 @@
           </a:lstStyle>
           <a:p>
             <a:r>
-              <a:rPr lang="de-DE" smtClean="0"/>
+              <a:rPr lang="de-DE"/>
               <a:t>Titelmasterformat durch Klicken bearbeiten</a:t>
             </a:r>
             <a:endParaRPr lang="en-US"/>
@@ -987,7 +1016,7 @@
           <a:p>
             <a:pPr lvl="0"/>
             <a:r>
-              <a:rPr lang="de-DE" smtClean="0"/>
+              <a:rPr lang="de-DE"/>
               <a:t>Formatvorlagen des Textmasters bearbeiten</a:t>
             </a:r>
           </a:p>
@@ -1010,7 +1039,7 @@
           <a:p>
             <a:fld id="{E7CC1B40-3AE4-4ADE-B0C0-5D973D016158}" type="datetimeFigureOut">
               <a:rPr lang="en-US" smtClean="0"/>
-              <a:t>9/22/2021</a:t>
+              <a:t>9/13/2023</a:t>
             </a:fld>
             <a:endParaRPr lang="en-US"/>
           </a:p>
@@ -1052,7 +1081,7 @@
           <a:p>
             <a:fld id="{BF2CA33F-8121-49DC-AA02-31EB13F2FAB8}" type="slidenum">
               <a:rPr lang="en-US" smtClean="0"/>
-              <a:t>‹Nr.›</a:t>
+              <a:t>‹#›</a:t>
             </a:fld>
             <a:endParaRPr lang="en-US"/>
           </a:p>
@@ -1104,7 +1133,7 @@
           <a:lstStyle/>
           <a:p>
             <a:r>
-              <a:rPr lang="de-DE" smtClean="0"/>
+              <a:rPr lang="de-DE"/>
               <a:t>Titelmasterformat durch Klicken bearbeiten</a:t>
             </a:r>
             <a:endParaRPr lang="en-US"/>
@@ -1133,35 +1162,35 @@
           <a:p>
             <a:pPr lvl="0"/>
             <a:r>
-              <a:rPr lang="de-DE" smtClean="0"/>
+              <a:rPr lang="de-DE"/>
               <a:t>Formatvorlagen des Textmasters bearbeiten</a:t>
             </a:r>
           </a:p>
           <a:p>
             <a:pPr lvl="1"/>
             <a:r>
-              <a:rPr lang="de-DE" smtClean="0"/>
+              <a:rPr lang="de-DE"/>
               <a:t>Zweite Ebene</a:t>
             </a:r>
           </a:p>
           <a:p>
             <a:pPr lvl="2"/>
             <a:r>
-              <a:rPr lang="de-DE" smtClean="0"/>
+              <a:rPr lang="de-DE"/>
               <a:t>Dritte Ebene</a:t>
             </a:r>
           </a:p>
           <a:p>
             <a:pPr lvl="3"/>
             <a:r>
-              <a:rPr lang="de-DE" smtClean="0"/>
+              <a:rPr lang="de-DE"/>
               <a:t>Vierte Ebene</a:t>
             </a:r>
           </a:p>
           <a:p>
             <a:pPr lvl="4"/>
             <a:r>
-              <a:rPr lang="de-DE" smtClean="0"/>
+              <a:rPr lang="de-DE"/>
               <a:t>Fünfte Ebene</a:t>
             </a:r>
             <a:endParaRPr lang="en-US"/>
@@ -1190,35 +1219,35 @@
           <a:p>
             <a:pPr lvl="0"/>
             <a:r>
-              <a:rPr lang="de-DE" smtClean="0"/>
+              <a:rPr lang="de-DE"/>
               <a:t>Formatvorlagen des Textmasters bearbeiten</a:t>
             </a:r>
           </a:p>
           <a:p>
             <a:pPr lvl="1"/>
             <a:r>
-              <a:rPr lang="de-DE" smtClean="0"/>
+              <a:rPr lang="de-DE"/>
               <a:t>Zweite Ebene</a:t>
             </a:r>
           </a:p>
           <a:p>
             <a:pPr lvl="2"/>
             <a:r>
-              <a:rPr lang="de-DE" smtClean="0"/>
+              <a:rPr lang="de-DE"/>
               <a:t>Dritte Ebene</a:t>
             </a:r>
           </a:p>
           <a:p>
             <a:pPr lvl="3"/>
             <a:r>
-              <a:rPr lang="de-DE" smtClean="0"/>
+              <a:rPr lang="de-DE"/>
               <a:t>Vierte Ebene</a:t>
             </a:r>
           </a:p>
           <a:p>
             <a:pPr lvl="4"/>
             <a:r>
-              <a:rPr lang="de-DE" smtClean="0"/>
+              <a:rPr lang="de-DE"/>
               <a:t>Fünfte Ebene</a:t>
             </a:r>
             <a:endParaRPr lang="en-US"/>
@@ -1242,7 +1271,7 @@
           <a:p>
             <a:fld id="{E7CC1B40-3AE4-4ADE-B0C0-5D973D016158}" type="datetimeFigureOut">
               <a:rPr lang="en-US" smtClean="0"/>
-              <a:t>9/22/2021</a:t>
+              <a:t>9/13/2023</a:t>
             </a:fld>
             <a:endParaRPr lang="en-US"/>
           </a:p>
@@ -1284,7 +1313,7 @@
           <a:p>
             <a:fld id="{BF2CA33F-8121-49DC-AA02-31EB13F2FAB8}" type="slidenum">
               <a:rPr lang="en-US" smtClean="0"/>
-              <a:t>‹Nr.›</a:t>
+              <a:t>‹#›</a:t>
             </a:fld>
             <a:endParaRPr lang="en-US"/>
           </a:p>
@@ -1341,7 +1370,7 @@
           <a:lstStyle/>
           <a:p>
             <a:r>
-              <a:rPr lang="de-DE" smtClean="0"/>
+              <a:rPr lang="de-DE"/>
               <a:t>Titelmasterformat durch Klicken bearbeiten</a:t>
             </a:r>
             <a:endParaRPr lang="en-US"/>
@@ -1407,7 +1436,7 @@
           <a:p>
             <a:pPr lvl="0"/>
             <a:r>
-              <a:rPr lang="de-DE" smtClean="0"/>
+              <a:rPr lang="de-DE"/>
               <a:t>Formatvorlagen des Textmasters bearbeiten</a:t>
             </a:r>
           </a:p>
@@ -1435,35 +1464,35 @@
           <a:p>
             <a:pPr lvl="0"/>
             <a:r>
-              <a:rPr lang="de-DE" smtClean="0"/>
+              <a:rPr lang="de-DE"/>
               <a:t>Formatvorlagen des Textmasters bearbeiten</a:t>
             </a:r>
           </a:p>
           <a:p>
             <a:pPr lvl="1"/>
             <a:r>
-              <a:rPr lang="de-DE" smtClean="0"/>
+              <a:rPr lang="de-DE"/>
               <a:t>Zweite Ebene</a:t>
             </a:r>
           </a:p>
           <a:p>
             <a:pPr lvl="2"/>
             <a:r>
-              <a:rPr lang="de-DE" smtClean="0"/>
+              <a:rPr lang="de-DE"/>
               <a:t>Dritte Ebene</a:t>
             </a:r>
           </a:p>
           <a:p>
             <a:pPr lvl="3"/>
             <a:r>
-              <a:rPr lang="de-DE" smtClean="0"/>
+              <a:rPr lang="de-DE"/>
               <a:t>Vierte Ebene</a:t>
             </a:r>
           </a:p>
           <a:p>
             <a:pPr lvl="4"/>
             <a:r>
-              <a:rPr lang="de-DE" smtClean="0"/>
+              <a:rPr lang="de-DE"/>
               <a:t>Fünfte Ebene</a:t>
             </a:r>
             <a:endParaRPr lang="en-US"/>
@@ -1529,7 +1558,7 @@
           <a:p>
             <a:pPr lvl="0"/>
             <a:r>
-              <a:rPr lang="de-DE" smtClean="0"/>
+              <a:rPr lang="de-DE"/>
               <a:t>Formatvorlagen des Textmasters bearbeiten</a:t>
             </a:r>
           </a:p>
@@ -1557,35 +1586,35 @@
           <a:p>
             <a:pPr lvl="0"/>
             <a:r>
-              <a:rPr lang="de-DE" smtClean="0"/>
+              <a:rPr lang="de-DE"/>
               <a:t>Formatvorlagen des Textmasters bearbeiten</a:t>
             </a:r>
           </a:p>
           <a:p>
             <a:pPr lvl="1"/>
             <a:r>
-              <a:rPr lang="de-DE" smtClean="0"/>
+              <a:rPr lang="de-DE"/>
               <a:t>Zweite Ebene</a:t>
             </a:r>
           </a:p>
           <a:p>
             <a:pPr lvl="2"/>
             <a:r>
-              <a:rPr lang="de-DE" smtClean="0"/>
+              <a:rPr lang="de-DE"/>
               <a:t>Dritte Ebene</a:t>
             </a:r>
           </a:p>
           <a:p>
             <a:pPr lvl="3"/>
             <a:r>
-              <a:rPr lang="de-DE" smtClean="0"/>
+              <a:rPr lang="de-DE"/>
               <a:t>Vierte Ebene</a:t>
             </a:r>
           </a:p>
           <a:p>
             <a:pPr lvl="4"/>
             <a:r>
-              <a:rPr lang="de-DE" smtClean="0"/>
+              <a:rPr lang="de-DE"/>
               <a:t>Fünfte Ebene</a:t>
             </a:r>
             <a:endParaRPr lang="en-US"/>
@@ -1609,7 +1638,7 @@
           <a:p>
             <a:fld id="{E7CC1B40-3AE4-4ADE-B0C0-5D973D016158}" type="datetimeFigureOut">
               <a:rPr lang="en-US" smtClean="0"/>
-              <a:t>9/22/2021</a:t>
+              <a:t>9/13/2023</a:t>
             </a:fld>
             <a:endParaRPr lang="en-US"/>
           </a:p>
@@ -1651,7 +1680,7 @@
           <a:p>
             <a:fld id="{BF2CA33F-8121-49DC-AA02-31EB13F2FAB8}" type="slidenum">
               <a:rPr lang="en-US" smtClean="0"/>
-              <a:t>‹Nr.›</a:t>
+              <a:t>‹#›</a:t>
             </a:fld>
             <a:endParaRPr lang="en-US"/>
           </a:p>
@@ -1703,7 +1732,7 @@
           <a:lstStyle/>
           <a:p>
             <a:r>
-              <a:rPr lang="de-DE" smtClean="0"/>
+              <a:rPr lang="de-DE"/>
               <a:t>Titelmasterformat durch Klicken bearbeiten</a:t>
             </a:r>
             <a:endParaRPr lang="en-US"/>
@@ -1727,7 +1756,7 @@
           <a:p>
             <a:fld id="{E7CC1B40-3AE4-4ADE-B0C0-5D973D016158}" type="datetimeFigureOut">
               <a:rPr lang="en-US" smtClean="0"/>
-              <a:t>9/22/2021</a:t>
+              <a:t>9/13/2023</a:t>
             </a:fld>
             <a:endParaRPr lang="en-US"/>
           </a:p>
@@ -1769,7 +1798,7 @@
           <a:p>
             <a:fld id="{BF2CA33F-8121-49DC-AA02-31EB13F2FAB8}" type="slidenum">
               <a:rPr lang="en-US" smtClean="0"/>
-              <a:t>‹Nr.›</a:t>
+              <a:t>‹#›</a:t>
             </a:fld>
             <a:endParaRPr lang="en-US"/>
           </a:p>
@@ -1822,7 +1851,7 @@
           <a:p>
             <a:fld id="{E7CC1B40-3AE4-4ADE-B0C0-5D973D016158}" type="datetimeFigureOut">
               <a:rPr lang="en-US" smtClean="0"/>
-              <a:t>9/22/2021</a:t>
+              <a:t>9/13/2023</a:t>
             </a:fld>
             <a:endParaRPr lang="en-US"/>
           </a:p>
@@ -1864,7 +1893,7 @@
           <a:p>
             <a:fld id="{BF2CA33F-8121-49DC-AA02-31EB13F2FAB8}" type="slidenum">
               <a:rPr lang="en-US" smtClean="0"/>
-              <a:t>‹Nr.›</a:t>
+              <a:t>‹#›</a:t>
             </a:fld>
             <a:endParaRPr lang="en-US"/>
           </a:p>
@@ -1925,7 +1954,7 @@
           </a:lstStyle>
           <a:p>
             <a:r>
-              <a:rPr lang="de-DE" smtClean="0"/>
+              <a:rPr lang="de-DE"/>
               <a:t>Titelmasterformat durch Klicken bearbeiten</a:t>
             </a:r>
             <a:endParaRPr lang="en-US"/>
@@ -1982,35 +2011,35 @@
           <a:p>
             <a:pPr lvl="0"/>
             <a:r>
-              <a:rPr lang="de-DE" smtClean="0"/>
+              <a:rPr lang="de-DE"/>
               <a:t>Formatvorlagen des Textmasters bearbeiten</a:t>
             </a:r>
           </a:p>
           <a:p>
             <a:pPr lvl="1"/>
             <a:r>
-              <a:rPr lang="de-DE" smtClean="0"/>
+              <a:rPr lang="de-DE"/>
               <a:t>Zweite Ebene</a:t>
             </a:r>
           </a:p>
           <a:p>
             <a:pPr lvl="2"/>
             <a:r>
-              <a:rPr lang="de-DE" smtClean="0"/>
+              <a:rPr lang="de-DE"/>
               <a:t>Dritte Ebene</a:t>
             </a:r>
           </a:p>
           <a:p>
             <a:pPr lvl="3"/>
             <a:r>
-              <a:rPr lang="de-DE" smtClean="0"/>
+              <a:rPr lang="de-DE"/>
               <a:t>Vierte Ebene</a:t>
             </a:r>
           </a:p>
           <a:p>
             <a:pPr lvl="4"/>
             <a:r>
-              <a:rPr lang="de-DE" smtClean="0"/>
+              <a:rPr lang="de-DE"/>
               <a:t>Fünfte Ebene</a:t>
             </a:r>
             <a:endParaRPr lang="en-US"/>
@@ -2076,7 +2105,7 @@
           <a:p>
             <a:pPr lvl="0"/>
             <a:r>
-              <a:rPr lang="de-DE" smtClean="0"/>
+              <a:rPr lang="de-DE"/>
               <a:t>Formatvorlagen des Textmasters bearbeiten</a:t>
             </a:r>
           </a:p>
@@ -2099,7 +2128,7 @@
           <a:p>
             <a:fld id="{E7CC1B40-3AE4-4ADE-B0C0-5D973D016158}" type="datetimeFigureOut">
               <a:rPr lang="en-US" smtClean="0"/>
-              <a:t>9/22/2021</a:t>
+              <a:t>9/13/2023</a:t>
             </a:fld>
             <a:endParaRPr lang="en-US"/>
           </a:p>
@@ -2141,7 +2170,7 @@
           <a:p>
             <a:fld id="{BF2CA33F-8121-49DC-AA02-31EB13F2FAB8}" type="slidenum">
               <a:rPr lang="en-US" smtClean="0"/>
-              <a:t>‹Nr.›</a:t>
+              <a:t>‹#›</a:t>
             </a:fld>
             <a:endParaRPr lang="en-US"/>
           </a:p>
@@ -2202,7 +2231,7 @@
           </a:lstStyle>
           <a:p>
             <a:r>
-              <a:rPr lang="de-DE" smtClean="0"/>
+              <a:rPr lang="de-DE"/>
               <a:t>Titelmasterformat durch Klicken bearbeiten</a:t>
             </a:r>
             <a:endParaRPr lang="en-US"/>
@@ -2329,7 +2358,7 @@
           <a:p>
             <a:pPr lvl="0"/>
             <a:r>
-              <a:rPr lang="de-DE" smtClean="0"/>
+              <a:rPr lang="de-DE"/>
               <a:t>Formatvorlagen des Textmasters bearbeiten</a:t>
             </a:r>
           </a:p>
@@ -2352,7 +2381,7 @@
           <a:p>
             <a:fld id="{E7CC1B40-3AE4-4ADE-B0C0-5D973D016158}" type="datetimeFigureOut">
               <a:rPr lang="en-US" smtClean="0"/>
-              <a:t>9/22/2021</a:t>
+              <a:t>9/13/2023</a:t>
             </a:fld>
             <a:endParaRPr lang="en-US"/>
           </a:p>
@@ -2394,7 +2423,7 @@
           <a:p>
             <a:fld id="{BF2CA33F-8121-49DC-AA02-31EB13F2FAB8}" type="slidenum">
               <a:rPr lang="en-US" smtClean="0"/>
-              <a:t>‹Nr.›</a:t>
+              <a:t>‹#›</a:t>
             </a:fld>
             <a:endParaRPr lang="en-US"/>
           </a:p>
@@ -2461,7 +2490,7 @@
           <a:lstStyle/>
           <a:p>
             <a:r>
-              <a:rPr lang="de-DE" smtClean="0"/>
+              <a:rPr lang="de-DE"/>
               <a:t>Titelmasterformat durch Klicken bearbeiten</a:t>
             </a:r>
             <a:endParaRPr lang="en-US"/>
@@ -2495,35 +2524,35 @@
           <a:p>
             <a:pPr lvl="0"/>
             <a:r>
-              <a:rPr lang="de-DE" smtClean="0"/>
+              <a:rPr lang="de-DE"/>
               <a:t>Formatvorlagen des Textmasters bearbeiten</a:t>
             </a:r>
           </a:p>
           <a:p>
             <a:pPr lvl="1"/>
             <a:r>
-              <a:rPr lang="de-DE" smtClean="0"/>
+              <a:rPr lang="de-DE"/>
               <a:t>Zweite Ebene</a:t>
             </a:r>
           </a:p>
           <a:p>
             <a:pPr lvl="2"/>
             <a:r>
-              <a:rPr lang="de-DE" smtClean="0"/>
+              <a:rPr lang="de-DE"/>
               <a:t>Dritte Ebene</a:t>
             </a:r>
           </a:p>
           <a:p>
             <a:pPr lvl="3"/>
             <a:r>
-              <a:rPr lang="de-DE" smtClean="0"/>
+              <a:rPr lang="de-DE"/>
               <a:t>Vierte Ebene</a:t>
             </a:r>
           </a:p>
           <a:p>
             <a:pPr lvl="4"/>
             <a:r>
-              <a:rPr lang="de-DE" smtClean="0"/>
+              <a:rPr lang="de-DE"/>
               <a:t>Fünfte Ebene</a:t>
             </a:r>
             <a:endParaRPr lang="en-US"/>
@@ -2565,7 +2594,7 @@
           <a:p>
             <a:fld id="{E7CC1B40-3AE4-4ADE-B0C0-5D973D016158}" type="datetimeFigureOut">
               <a:rPr lang="en-US" smtClean="0"/>
-              <a:t>9/22/2021</a:t>
+              <a:t>9/13/2023</a:t>
             </a:fld>
             <a:endParaRPr lang="en-US"/>
           </a:p>
@@ -2643,7 +2672,7 @@
           <a:p>
             <a:fld id="{BF2CA33F-8121-49DC-AA02-31EB13F2FAB8}" type="slidenum">
               <a:rPr lang="en-US" smtClean="0"/>
-              <a:t>‹Nr.›</a:t>
+              <a:t>‹#›</a:t>
             </a:fld>
             <a:endParaRPr lang="en-US"/>
           </a:p>
@@ -3316,11 +3345,7 @@
           <a:p>
             <a:r>
               <a:rPr lang="de-DE"/>
-              <a:t>A</a:t>
-            </a:r>
-            <a:r>
-              <a:rPr lang="de-DE" smtClean="0"/>
-              <a:t>bsorb</a:t>
+              <a:t>Absorb</a:t>
             </a:r>
             <a:endParaRPr lang="en-US"/>
           </a:p>
@@ -3349,7 +3374,7 @@
           <a:lstStyle/>
           <a:p>
             <a:r>
-              <a:rPr lang="de-DE" smtClean="0"/>
+              <a:rPr lang="de-DE"/>
               <a:t>Recover</a:t>
             </a:r>
             <a:endParaRPr lang="en-US"/>
@@ -3379,7 +3404,7 @@
           <a:lstStyle/>
           <a:p>
             <a:r>
-              <a:rPr lang="de-DE" smtClean="0"/>
+              <a:rPr lang="de-DE"/>
               <a:t>Adapt &amp; Transform</a:t>
             </a:r>
             <a:endParaRPr lang="en-US"/>
@@ -3445,7 +3470,7 @@
           <a:lstStyle/>
           <a:p>
             <a:r>
-              <a:rPr lang="de-DE" i="1" smtClean="0"/>
+              <a:rPr lang="de-DE" i="1"/>
               <a:t>Time</a:t>
             </a:r>
             <a:endParaRPr lang="en-US" i="1"/>
@@ -3475,7 +3500,7 @@
           <a:lstStyle/>
           <a:p>
             <a:r>
-              <a:rPr lang="de-DE" i="1" smtClean="0"/>
+              <a:rPr lang="de-DE" i="1"/>
               <a:t>Land-use Probability</a:t>
             </a:r>
             <a:endParaRPr lang="en-US" i="1"/>
@@ -3506,7 +3531,7 @@
           <a:p>
             <a:pPr algn="ctr"/>
             <a:r>
-              <a:rPr lang="de-DE" b="1" i="1" smtClean="0">
+              <a:rPr lang="de-DE" b="1" i="1">
                 <a:latin typeface="Segoe UI" panose="020B0502040204020203" pitchFamily="34" charset="0"/>
                 <a:cs typeface="Segoe UI" panose="020B0502040204020203" pitchFamily="34" charset="0"/>
               </a:rPr>
@@ -3616,7 +3641,7 @@
           <a:lstStyle/>
           <a:p>
             <a:r>
-              <a:rPr lang="de-DE" sz="1600" i="1" smtClean="0"/>
+              <a:rPr lang="de-DE" sz="1600" i="1"/>
               <a:t>Baseline weather (e.g. 30 year average)</a:t>
             </a:r>
             <a:endParaRPr lang="en-US" sz="1600" i="1"/>
@@ -3646,7 +3671,7 @@
           <a:lstStyle/>
           <a:p>
             <a:r>
-              <a:rPr lang="de-DE" sz="1600" i="1" smtClean="0"/>
+              <a:rPr lang="de-DE" sz="1600" i="1"/>
               <a:t>Shocked system </a:t>
             </a:r>
             <a:endParaRPr lang="en-US" sz="1600" i="1"/>
@@ -3661,8 +3686,8 @@
         </p:nvSpPr>
         <p:spPr>
           <a:xfrm>
-            <a:off x="191950" y="131305"/>
-            <a:ext cx="7613751" cy="369332"/>
+            <a:off x="356545" y="214407"/>
+            <a:ext cx="6087949" cy="369332"/>
           </a:xfrm>
           <a:prstGeom prst="rect">
             <a:avLst/>
@@ -3676,10 +3701,10 @@
           <a:lstStyle/>
           <a:p>
             <a:r>
-              <a:rPr lang="de-DE" b="1" smtClean="0"/>
-              <a:t>Dynamic Adaptation behavior due to extreme weather events/climate change</a:t>
-            </a:r>
-            <a:endParaRPr lang="en-US" b="1"/>
+              <a:rPr lang="de-DE" b="1" dirty="0"/>
+              <a:t>Dynamic Adaptation behavior due to extreme weather events</a:t>
+            </a:r>
+            <a:endParaRPr lang="en-US" b="1" dirty="0"/>
           </a:p>
         </p:txBody>
       </p:sp>
@@ -3693,13 +3718,6 @@
   <p:clrMapOvr>
     <a:masterClrMapping/>
   </p:clrMapOvr>
-  <p:timing>
-    <p:tnLst>
-      <p:par>
-        <p:cTn id="1" dur="indefinite" restart="never" nodeType="tmRoot"/>
-      </p:par>
-    </p:tnLst>
-  </p:timing>
 </p:sld>
 </file>
 
@@ -4102,11 +4120,7 @@
           <a:p>
             <a:r>
               <a:rPr lang="de-DE"/>
-              <a:t>A</a:t>
-            </a:r>
-            <a:r>
-              <a:rPr lang="de-DE" smtClean="0"/>
-              <a:t>bsorb</a:t>
+              <a:t>Absorb</a:t>
             </a:r>
             <a:endParaRPr lang="en-US"/>
           </a:p>
@@ -4135,7 +4149,7 @@
           <a:lstStyle/>
           <a:p>
             <a:r>
-              <a:rPr lang="de-DE" smtClean="0"/>
+              <a:rPr lang="de-DE"/>
               <a:t>Recover</a:t>
             </a:r>
             <a:endParaRPr lang="en-US"/>
@@ -4165,7 +4179,7 @@
           <a:lstStyle/>
           <a:p>
             <a:r>
-              <a:rPr lang="de-DE" smtClean="0"/>
+              <a:rPr lang="de-DE"/>
               <a:t>Adapt &amp; Transform</a:t>
             </a:r>
             <a:endParaRPr lang="en-US"/>
@@ -4182,13 +4196,6 @@
   <p:clrMapOvr>
     <a:masterClrMapping/>
   </p:clrMapOvr>
-  <p:timing>
-    <p:tnLst>
-      <p:par>
-        <p:cTn id="1" dur="indefinite" restart="never" nodeType="tmRoot"/>
-      </p:par>
-    </p:tnLst>
-  </p:timing>
 </p:sld>
 </file>
 

</xml_diff>